<commit_message>
... presentation updated: references to the corresponding project on the github.com appended.
</commit_message>
<xml_diff>
--- a/junit/doc/Kata_-_Java-Tests-JUnit 4_-_Artem-Kaftanenko.pptx
+++ b/junit/doc/Kata_-_Java-Tests-JUnit 4_-_Artem-Kaftanenko.pptx
@@ -207,7 +207,7 @@
             <a:fld id="{076953D6-4199-4257-98C3-4D4652C09C19}" type="datetimeFigureOut">
               <a:rPr lang="de-DE" smtClean="0"/>
               <a:pPr/>
-              <a:t>23.02.2012</a:t>
+              <a:t>01.03.2012</a:t>
             </a:fld>
             <a:endParaRPr lang="de-DE"/>
           </a:p>
@@ -375,7 +375,7 @@
             <a:fld id="{5548DF91-A060-4BC5-BE53-85E6A7108214}" type="datetimeFigureOut">
               <a:rPr lang="de-DE" smtClean="0"/>
               <a:pPr/>
-              <a:t>23.02.2012</a:t>
+              <a:t>01.03.2012</a:t>
             </a:fld>
             <a:endParaRPr lang="de-DE"/>
           </a:p>
@@ -900,7 +900,7 @@
             <a:fld id="{35FBF5FB-B419-4229-B48C-15D6CA8D86DE}" type="datetime1">
               <a:rPr lang="de-DE" smtClean="0"/>
               <a:pPr/>
-              <a:t>23.02.2012</a:t>
+              <a:t>01.03.2012</a:t>
             </a:fld>
             <a:endParaRPr lang="de-DE"/>
           </a:p>
@@ -1247,7 +1247,7 @@
             <a:fld id="{608AC013-7795-4040-8907-78702D37FA65}" type="datetime1">
               <a:rPr lang="de-DE" smtClean="0"/>
               <a:pPr/>
-              <a:t>23.02.2012</a:t>
+              <a:t>01.03.2012</a:t>
             </a:fld>
             <a:endParaRPr lang="de-DE"/>
           </a:p>
@@ -1610,7 +1610,7 @@
             <a:fld id="{A481CF2A-5CF3-4863-854D-525EBBABDDBD}" type="datetime1">
               <a:rPr lang="de-DE" smtClean="0"/>
               <a:pPr/>
-              <a:t>23.02.2012</a:t>
+              <a:t>01.03.2012</a:t>
             </a:fld>
             <a:endParaRPr lang="de-DE"/>
           </a:p>
@@ -2119,7 +2119,7 @@
             <a:fld id="{65A84338-3B05-439D-AF85-C6DAE00641BE}" type="datetime1">
               <a:rPr lang="de-DE" smtClean="0"/>
               <a:pPr/>
-              <a:t>23.02.2012</a:t>
+              <a:t>01.03.2012</a:t>
             </a:fld>
             <a:endParaRPr lang="de-DE"/>
           </a:p>
@@ -2308,7 +2308,7 @@
             <a:fld id="{CACE1264-3A22-4140-B735-4E70B41A7E4B}" type="datetime1">
               <a:rPr lang="de-DE" smtClean="0"/>
               <a:pPr/>
-              <a:t>23.02.2012</a:t>
+              <a:t>01.03.2012</a:t>
             </a:fld>
             <a:endParaRPr lang="de-DE"/>
           </a:p>
@@ -2474,7 +2474,7 @@
             <a:fld id="{14D7D2EE-C42E-4812-9E68-CE066CA71221}" type="datetime1">
               <a:rPr lang="de-DE" smtClean="0"/>
               <a:pPr/>
-              <a:t>23.02.2012</a:t>
+              <a:t>01.03.2012</a:t>
             </a:fld>
             <a:endParaRPr lang="de-DE"/>
           </a:p>
@@ -2750,7 +2750,7 @@
             <a:fld id="{E8DDCCCA-F48D-4195-9C0A-4828E6F808B8}" type="datetime1">
               <a:rPr lang="de-DE" smtClean="0"/>
               <a:pPr/>
-              <a:t>23.02.2012</a:t>
+              <a:t>01.03.2012</a:t>
             </a:fld>
             <a:endParaRPr lang="de-DE"/>
           </a:p>
@@ -3004,7 +3004,7 @@
             <a:fld id="{D9D54644-F3D2-42DC-B3E9-6611131D6689}" type="datetime1">
               <a:rPr lang="de-DE" smtClean="0"/>
               <a:pPr/>
-              <a:t>23.02.2012</a:t>
+              <a:t>01.03.2012</a:t>
             </a:fld>
             <a:endParaRPr lang="de-DE"/>
           </a:p>
@@ -3230,7 +3230,7 @@
             <a:fld id="{B6FE16F7-098C-4F93-830D-C306BC844EB2}" type="datetime1">
               <a:rPr lang="de-DE" smtClean="0"/>
               <a:pPr/>
-              <a:t>23.02.2012</a:t>
+              <a:t>01.03.2012</a:t>
             </a:fld>
             <a:endParaRPr lang="de-DE"/>
           </a:p>
@@ -3673,7 +3673,15 @@
           <a:p>
             <a:r>
               <a:rPr lang="de-DE" dirty="0" smtClean="0"/>
-              <a:t>Kata - Tests - Java - JUnit 4</a:t>
+              <a:t>Kata - Java - </a:t>
+            </a:r>
+            <a:r>
+              <a:rPr lang="de-DE" dirty="0"/>
+              <a:t>Tests - JUnit </a:t>
+            </a:r>
+            <a:r>
+              <a:rPr lang="de-DE" dirty="0" smtClean="0"/>
+              <a:t>4</a:t>
             </a:r>
             <a:endParaRPr lang="de-DE" dirty="0"/>
           </a:p>
@@ -4030,6 +4038,12 @@
             <a:pPr marL="0" indent="0">
               <a:buNone/>
             </a:pPr>
+            <a:endParaRPr lang="de-DE" sz="1600" dirty="0" smtClean="0"/>
+          </a:p>
+          <a:p>
+            <a:pPr marL="0" indent="0">
+              <a:buNone/>
+            </a:pPr>
             <a:endParaRPr lang="de-DE" sz="1600" dirty="0"/>
           </a:p>
           <a:p>
@@ -4039,12 +4053,16 @@
             <a:endParaRPr lang="de-DE" sz="1600" dirty="0" smtClean="0"/>
           </a:p>
           <a:p>
-            <a:pPr marL="0" indent="0">
+            <a:pPr marL="0" lvl="0" indent="0">
               <a:buNone/>
             </a:pPr>
             <a:r>
-              <a:rPr lang="de-DE" sz="1600" dirty="0" smtClean="0"/>
-              <a:t>---</a:t>
+              <a:rPr lang="de-DE" sz="1200" dirty="0">
+                <a:solidFill>
+                  <a:prstClr val="black"/>
+                </a:solidFill>
+              </a:rPr>
+              <a:t>___ </a:t>
             </a:r>
           </a:p>
           <a:p>
@@ -4052,13 +4070,34 @@
               <a:buNone/>
             </a:pPr>
             <a:r>
-              <a:rPr lang="de-DE" sz="1600" dirty="0">
+              <a:rPr lang="de-DE" sz="1200" dirty="0">
+                <a:solidFill>
+                  <a:srgbClr val="FF0000"/>
+                </a:solidFill>
+              </a:rPr>
+              <a:t>*</a:t>
+            </a:r>
+            <a:r>
+              <a:rPr lang="de-DE" sz="1200" dirty="0">
                 <a:solidFill>
                   <a:prstClr val="black"/>
                 </a:solidFill>
               </a:rPr>
-              <a:t>* das Skeleton-Projekt beim Bedarf bei dem Vortragshalter anfordern</a:t>
-            </a:r>
+              <a:t> das Skeleton-Projekt erhältlich unter </a:t>
+            </a:r>
+            <a:r>
+              <a:rPr lang="de-DE" sz="1200" b="1" dirty="0">
+                <a:solidFill>
+                  <a:prstClr val="black"/>
+                </a:solidFill>
+              </a:rPr>
+              <a:t>https://github.com/kaftanenko/edu.java</a:t>
+            </a:r>
+            <a:endParaRPr lang="de-DE" sz="1200" b="1" dirty="0">
+              <a:solidFill>
+                <a:prstClr val="black"/>
+              </a:solidFill>
+            </a:endParaRPr>
           </a:p>
         </p:txBody>
       </p:sp>
@@ -5715,7 +5754,7 @@
               <a:t> s.g. </a:t>
             </a:r>
             <a:r>
-              <a:rPr lang="de-DE" b="1" dirty="0">
+              <a:rPr lang="de-DE" b="1" dirty="0" smtClean="0">
                 <a:solidFill>
                   <a:srgbClr val="FF0000"/>
                 </a:solidFill>
@@ -5723,8 +5762,12 @@
               <a:t>assert</a:t>
             </a:r>
             <a:r>
+              <a:rPr lang="de-DE" dirty="0" smtClean="0"/>
+              <a:t>-Methoden</a:t>
+            </a:r>
+            <a:r>
               <a:rPr lang="de-DE" dirty="0"/>
-              <a:t>-Methoden.</a:t>
+              <a:t>.</a:t>
             </a:r>
           </a:p>
           <a:p>
@@ -5862,7 +5905,7 @@
             </a:pPr>
             <a:r>
               <a:rPr lang="de-DE" sz="1300" dirty="0" smtClean="0"/>
-              <a:t>---</a:t>
+              <a:t>___</a:t>
             </a:r>
           </a:p>
           <a:p>
@@ -5870,18 +5913,34 @@
               <a:buNone/>
             </a:pPr>
             <a:r>
+              <a:rPr lang="de-DE" sz="1300" dirty="0" smtClean="0">
+                <a:solidFill>
+                  <a:srgbClr val="FF0000"/>
+                </a:solidFill>
+              </a:rPr>
+              <a:t>*</a:t>
+            </a:r>
+            <a:r>
               <a:rPr lang="de-DE" sz="1300" dirty="0" smtClean="0"/>
-              <a:t>* erhältlich </a:t>
+              <a:t> erhältlich </a:t>
             </a:r>
             <a:r>
               <a:rPr lang="de-DE" sz="1300" dirty="0"/>
-              <a:t>per "import static </a:t>
-            </a:r>
-            <a:r>
-              <a:rPr lang="de-DE" sz="1300" smtClean="0"/>
-              <a:t>org.junit.Assert.*;“</a:t>
-            </a:r>
-            <a:endParaRPr lang="de-DE" sz="1300" dirty="0"/>
+              <a:t>per </a:t>
+            </a:r>
+            <a:r>
+              <a:rPr lang="de-DE" sz="1300" b="1" dirty="0" smtClean="0"/>
+              <a:t>import </a:t>
+            </a:r>
+            <a:r>
+              <a:rPr lang="de-DE" sz="1300" b="1" dirty="0"/>
+              <a:t>static </a:t>
+            </a:r>
+            <a:r>
+              <a:rPr lang="de-DE" sz="1300" b="1" dirty="0" smtClean="0"/>
+              <a:t>org.junit.Assert.*;</a:t>
+            </a:r>
+            <a:endParaRPr lang="de-DE" sz="1300" b="1" dirty="0"/>
           </a:p>
         </p:txBody>
       </p:sp>
@@ -5991,6 +6050,14 @@
               <a:t>SimpleCalculatorMultiplicationTest</a:t>
             </a:r>
             <a:r>
+              <a:rPr lang="de-DE" dirty="0" smtClean="0">
+                <a:solidFill>
+                  <a:srgbClr val="FF0000"/>
+                </a:solidFill>
+              </a:rPr>
+              <a:t>*</a:t>
+            </a:r>
+            <a:r>
               <a:rPr lang="de-DE" dirty="0" smtClean="0"/>
               <a:t> implementieren für:</a:t>
             </a:r>
@@ -6072,6 +6139,16 @@
             <a:pPr marL="0" lvl="0" indent="0">
               <a:buNone/>
             </a:pPr>
+            <a:endParaRPr lang="de-DE" sz="1600" dirty="0" smtClean="0">
+              <a:solidFill>
+                <a:prstClr val="black"/>
+              </a:solidFill>
+            </a:endParaRPr>
+          </a:p>
+          <a:p>
+            <a:pPr marL="0" lvl="0" indent="0">
+              <a:buNone/>
+            </a:pPr>
             <a:endParaRPr lang="de-DE" sz="1600" dirty="0">
               <a:solidFill>
                 <a:prstClr val="black"/>
@@ -6083,14 +6160,14 @@
               <a:buNone/>
             </a:pPr>
             <a:r>
-              <a:rPr lang="de-DE" sz="1600" dirty="0" smtClean="0">
+              <a:rPr lang="de-DE" sz="1200" dirty="0" smtClean="0">
                 <a:solidFill>
                   <a:prstClr val="black"/>
                 </a:solidFill>
               </a:rPr>
-              <a:t>---</a:t>
-            </a:r>
-            <a:endParaRPr lang="de-DE" sz="1600" dirty="0">
+              <a:t>___ </a:t>
+            </a:r>
+            <a:endParaRPr lang="de-DE" sz="1200" dirty="0">
               <a:solidFill>
                 <a:prstClr val="black"/>
               </a:solidFill>
@@ -6101,13 +6178,50 @@
               <a:buNone/>
             </a:pPr>
             <a:r>
-              <a:rPr lang="de-DE" sz="1600" dirty="0">
+              <a:rPr lang="de-DE" sz="1200" dirty="0">
+                <a:solidFill>
+                  <a:srgbClr val="FF0000"/>
+                </a:solidFill>
+              </a:rPr>
+              <a:t>*</a:t>
+            </a:r>
+            <a:r>
+              <a:rPr lang="de-DE" sz="1200" dirty="0">
                 <a:solidFill>
                   <a:prstClr val="black"/>
                 </a:solidFill>
               </a:rPr>
-              <a:t>* das Skeleton-Projekt beim Bedarf bei dem Vortragshalter anfordern</a:t>
-            </a:r>
+              <a:t> das </a:t>
+            </a:r>
+            <a:r>
+              <a:rPr lang="de-DE" sz="1200" dirty="0" smtClean="0">
+                <a:solidFill>
+                  <a:prstClr val="black"/>
+                </a:solidFill>
+              </a:rPr>
+              <a:t>Skeleton-Projekt </a:t>
+            </a:r>
+            <a:r>
+              <a:rPr lang="de-DE" sz="1200" dirty="0" smtClean="0">
+                <a:solidFill>
+                  <a:prstClr val="black"/>
+                </a:solidFill>
+              </a:rPr>
+              <a:t>erhältlich unter </a:t>
+            </a:r>
+            <a:r>
+              <a:rPr lang="de-DE" sz="1200" b="1" dirty="0">
+                <a:solidFill>
+                  <a:prstClr val="black"/>
+                </a:solidFill>
+              </a:rPr>
+              <a:t>https://github.com/kaftanenko/edu.java</a:t>
+            </a:r>
+            <a:endParaRPr lang="de-DE" sz="1200" b="1" dirty="0">
+              <a:solidFill>
+                <a:prstClr val="black"/>
+              </a:solidFill>
+            </a:endParaRPr>
           </a:p>
         </p:txBody>
       </p:sp>
@@ -6597,6 +6711,16 @@
             <a:pPr marL="0" lvl="0" indent="0">
               <a:buNone/>
             </a:pPr>
+            <a:endParaRPr lang="de-DE" sz="1600" dirty="0" smtClean="0">
+              <a:solidFill>
+                <a:prstClr val="black"/>
+              </a:solidFill>
+            </a:endParaRPr>
+          </a:p>
+          <a:p>
+            <a:pPr marL="0" lvl="0" indent="0">
+              <a:buNone/>
+            </a:pPr>
             <a:endParaRPr lang="de-DE" sz="1600" dirty="0">
               <a:solidFill>
                 <a:prstClr val="black"/>
@@ -6618,63 +6742,47 @@
               <a:buNone/>
             </a:pPr>
             <a:r>
-              <a:rPr lang="de-DE" sz="1600" dirty="0" smtClean="0">
+              <a:rPr lang="de-DE" sz="1200" dirty="0">
                 <a:solidFill>
                   <a:prstClr val="black"/>
                 </a:solidFill>
               </a:rPr>
-              <a:t>---</a:t>
-            </a:r>
-            <a:endParaRPr lang="de-DE" sz="1600" dirty="0">
+              <a:t>___ </a:t>
+            </a:r>
+          </a:p>
+          <a:p>
+            <a:pPr marL="0" lvl="0" indent="0">
+              <a:buNone/>
+            </a:pPr>
+            <a:r>
+              <a:rPr lang="de-DE" sz="1200" dirty="0">
+                <a:solidFill>
+                  <a:srgbClr val="FF0000"/>
+                </a:solidFill>
+              </a:rPr>
+              <a:t>*</a:t>
+            </a:r>
+            <a:r>
+              <a:rPr lang="de-DE" sz="1200" dirty="0">
+                <a:solidFill>
+                  <a:prstClr val="black"/>
+                </a:solidFill>
+              </a:rPr>
+              <a:t> das Skeleton-Projekt erhältlich unter </a:t>
+            </a:r>
+            <a:r>
+              <a:rPr lang="de-DE" sz="1200" b="1" dirty="0">
+                <a:solidFill>
+                  <a:prstClr val="black"/>
+                </a:solidFill>
+              </a:rPr>
+              <a:t>https://github.com/kaftanenko/edu.java</a:t>
+            </a:r>
+            <a:endParaRPr lang="de-DE" sz="1200" b="1" dirty="0">
               <a:solidFill>
                 <a:prstClr val="black"/>
               </a:solidFill>
             </a:endParaRPr>
-          </a:p>
-          <a:p>
-            <a:pPr marL="0" lvl="0" indent="0">
-              <a:buNone/>
-            </a:pPr>
-            <a:r>
-              <a:rPr lang="de-DE" sz="1600" dirty="0">
-                <a:solidFill>
-                  <a:prstClr val="black"/>
-                </a:solidFill>
-              </a:rPr>
-              <a:t>* d</a:t>
-            </a:r>
-            <a:r>
-              <a:rPr lang="de-DE" sz="1600" dirty="0" smtClean="0">
-                <a:solidFill>
-                  <a:prstClr val="black"/>
-                </a:solidFill>
-              </a:rPr>
-              <a:t>as Skeleton-Projekt </a:t>
-            </a:r>
-            <a:r>
-              <a:rPr lang="de-DE" sz="1600" dirty="0">
-                <a:solidFill>
-                  <a:prstClr val="black"/>
-                </a:solidFill>
-              </a:rPr>
-              <a:t>beim </a:t>
-            </a:r>
-            <a:r>
-              <a:rPr lang="de-DE" sz="1600" dirty="0" smtClean="0">
-                <a:solidFill>
-                  <a:prstClr val="black"/>
-                </a:solidFill>
-              </a:rPr>
-              <a:t>Bedarf bei dem Vortragshalter </a:t>
-            </a:r>
-            <a:r>
-              <a:rPr lang="de-DE" sz="1600" dirty="0">
-                <a:solidFill>
-                  <a:prstClr val="black"/>
-                </a:solidFill>
-              </a:rPr>
-              <a:t>anfordern</a:t>
-            </a:r>
           </a:p>
         </p:txBody>
       </p:sp>

</xml_diff>